<commit_message>
MAJ - COrrige partiel
</commit_message>
<xml_diff>
--- a/01_Combinatoire/TD_03_Girouette/images/Figures.pptx
+++ b/01_Combinatoire/TD_03_Girouette/images/Figures.pptx
@@ -295,7 +295,7 @@
           <a:p>
             <a:fld id="{AA309A6D-C09C-4548-B29A-6CF363A7E532}" type="datetimeFigureOut">
               <a:rPr lang="fr-FR" smtClean="0"/>
-              <a:t>29/03/2014</a:t>
+              <a:t>03/04/2015</a:t>
             </a:fld>
             <a:endParaRPr lang="fr-BE"/>
           </a:p>
@@ -460,7 +460,7 @@
           <a:p>
             <a:fld id="{AA309A6D-C09C-4548-B29A-6CF363A7E532}" type="datetimeFigureOut">
               <a:rPr lang="fr-FR" smtClean="0"/>
-              <a:t>29/03/2014</a:t>
+              <a:t>03/04/2015</a:t>
             </a:fld>
             <a:endParaRPr lang="fr-BE"/>
           </a:p>
@@ -635,7 +635,7 @@
           <a:p>
             <a:fld id="{AA309A6D-C09C-4548-B29A-6CF363A7E532}" type="datetimeFigureOut">
               <a:rPr lang="fr-FR" smtClean="0"/>
-              <a:t>29/03/2014</a:t>
+              <a:t>03/04/2015</a:t>
             </a:fld>
             <a:endParaRPr lang="fr-BE"/>
           </a:p>
@@ -800,7 +800,7 @@
           <a:p>
             <a:fld id="{AA309A6D-C09C-4548-B29A-6CF363A7E532}" type="datetimeFigureOut">
               <a:rPr lang="fr-FR" smtClean="0"/>
-              <a:t>29/03/2014</a:t>
+              <a:t>03/04/2015</a:t>
             </a:fld>
             <a:endParaRPr lang="fr-BE"/>
           </a:p>
@@ -1041,7 +1041,7 @@
           <a:p>
             <a:fld id="{AA309A6D-C09C-4548-B29A-6CF363A7E532}" type="datetimeFigureOut">
               <a:rPr lang="fr-FR" smtClean="0"/>
-              <a:t>29/03/2014</a:t>
+              <a:t>03/04/2015</a:t>
             </a:fld>
             <a:endParaRPr lang="fr-BE"/>
           </a:p>
@@ -1324,7 +1324,7 @@
           <a:p>
             <a:fld id="{AA309A6D-C09C-4548-B29A-6CF363A7E532}" type="datetimeFigureOut">
               <a:rPr lang="fr-FR" smtClean="0"/>
-              <a:t>29/03/2014</a:t>
+              <a:t>03/04/2015</a:t>
             </a:fld>
             <a:endParaRPr lang="fr-BE"/>
           </a:p>
@@ -1741,7 +1741,7 @@
           <a:p>
             <a:fld id="{AA309A6D-C09C-4548-B29A-6CF363A7E532}" type="datetimeFigureOut">
               <a:rPr lang="fr-FR" smtClean="0"/>
-              <a:t>29/03/2014</a:t>
+              <a:t>03/04/2015</a:t>
             </a:fld>
             <a:endParaRPr lang="fr-BE"/>
           </a:p>
@@ -1854,7 +1854,7 @@
           <a:p>
             <a:fld id="{AA309A6D-C09C-4548-B29A-6CF363A7E532}" type="datetimeFigureOut">
               <a:rPr lang="fr-FR" smtClean="0"/>
-              <a:t>29/03/2014</a:t>
+              <a:t>03/04/2015</a:t>
             </a:fld>
             <a:endParaRPr lang="fr-BE"/>
           </a:p>
@@ -1944,7 +1944,7 @@
           <a:p>
             <a:fld id="{AA309A6D-C09C-4548-B29A-6CF363A7E532}" type="datetimeFigureOut">
               <a:rPr lang="fr-FR" smtClean="0"/>
-              <a:t>29/03/2014</a:t>
+              <a:t>03/04/2015</a:t>
             </a:fld>
             <a:endParaRPr lang="fr-BE"/>
           </a:p>
@@ -2216,7 +2216,7 @@
           <a:p>
             <a:fld id="{AA309A6D-C09C-4548-B29A-6CF363A7E532}" type="datetimeFigureOut">
               <a:rPr lang="fr-FR" smtClean="0"/>
-              <a:t>29/03/2014</a:t>
+              <a:t>03/04/2015</a:t>
             </a:fld>
             <a:endParaRPr lang="fr-BE"/>
           </a:p>
@@ -2464,7 +2464,7 @@
           <a:p>
             <a:fld id="{AA309A6D-C09C-4548-B29A-6CF363A7E532}" type="datetimeFigureOut">
               <a:rPr lang="fr-FR" smtClean="0"/>
-              <a:t>29/03/2014</a:t>
+              <a:t>03/04/2015</a:t>
             </a:fld>
             <a:endParaRPr lang="fr-BE"/>
           </a:p>
@@ -2672,7 +2672,7 @@
           <a:p>
             <a:fld id="{AA309A6D-C09C-4548-B29A-6CF363A7E532}" type="datetimeFigureOut">
               <a:rPr lang="fr-FR" smtClean="0"/>
-              <a:t>29/03/2014</a:t>
+              <a:t>03/04/2015</a:t>
             </a:fld>
             <a:endParaRPr lang="fr-BE"/>
           </a:p>
@@ -3072,13 +3072,13 @@
           </a:fontRef>
         </p:style>
         <p:txBody>
-          <a:bodyPr rtlCol="0" anchor="ctr"/>
+          <a:bodyPr rtlCol="0" anchor="t"/>
           <a:lstStyle/>
           <a:p>
             <a:pPr algn="ctr"/>
             <a:r>
               <a:rPr lang="fr-FR" b="1" dirty="0" smtClean="0"/>
-              <a:t>SOMFY</a:t>
+              <a:t>STORE</a:t>
             </a:r>
             <a:endParaRPr lang="fr-FR" b="1" dirty="0"/>
           </a:p>
@@ -3399,6 +3399,47 @@
           </a:p>
         </p:txBody>
       </p:sp>
+      <p:pic>
+        <p:nvPicPr>
+          <p:cNvPr id="1026" name="Picture 2" descr="http://www.stores-destock.com/img/cms/achat%20store%20banne.jpg"/>
+          <p:cNvPicPr>
+            <a:picLocks noChangeAspect="1" noChangeArrowheads="1"/>
+          </p:cNvPicPr>
+          <p:nvPr/>
+        </p:nvPicPr>
+        <p:blipFill>
+          <a:blip r:embed="rId2" cstate="print">
+            <a:extLst>
+              <a:ext uri="{28A0092B-C50C-407E-A947-70E740481C1C}">
+                <a14:useLocalDpi xmlns:a14="http://schemas.microsoft.com/office/drawing/2010/main" val="0"/>
+              </a:ext>
+            </a:extLst>
+          </a:blip>
+          <a:srcRect/>
+          <a:stretch>
+            <a:fillRect/>
+          </a:stretch>
+        </p:blipFill>
+        <p:spPr bwMode="auto">
+          <a:xfrm>
+            <a:off x="3188815" y="1786187"/>
+            <a:ext cx="1326209" cy="1326209"/>
+          </a:xfrm>
+          <a:prstGeom prst="rect">
+            <a:avLst/>
+          </a:prstGeom>
+          <a:noFill/>
+          <a:extLst>
+            <a:ext uri="{909E8E84-426E-40DD-AFC4-6F175D3DCCD1}">
+              <a14:hiddenFill xmlns:a14="http://schemas.microsoft.com/office/drawing/2010/main">
+                <a:solidFill>
+                  <a:srgbClr val="FFFFFF"/>
+                </a:solidFill>
+              </a14:hiddenFill>
+            </a:ext>
+          </a:extLst>
+        </p:spPr>
+      </p:pic>
     </p:spTree>
     <p:extLst>
       <p:ext uri="{BB962C8B-B14F-4D97-AF65-F5344CB8AC3E}">

</xml_diff>